<commit_message>
Updated checkpoint with missing parts
</commit_message>
<xml_diff>
--- a/Checkpoint 1 gil.pptx
+++ b/Checkpoint 1 gil.pptx
@@ -5430,15 +5430,6 @@
                 <a:latin typeface="Helvetica" panose="020B0604020202020204" pitchFamily="34" charset="0"/>
                 <a:cs typeface="Helvetica" panose="020B0604020202020204" pitchFamily="34" charset="0"/>
               </a:rPr>
-              <a:t>Cada aplicação desenvolvida na universidade precisa do seu próprio sistema de autenticação e autorização.</a:t>
-            </a:r>
-          </a:p>
-          <a:p>
-            <a:r>
-              <a:rPr lang="pt-PT" dirty="0">
-                <a:latin typeface="Helvetica" panose="020B0604020202020204" pitchFamily="34" charset="0"/>
-                <a:cs typeface="Helvetica" panose="020B0604020202020204" pitchFamily="34" charset="0"/>
-              </a:rPr>
               <a:t>Os utilizadores precisam de memorizar um par </a:t>
             </a:r>
             <a:r>
@@ -5453,7 +5444,16 @@
                 <a:latin typeface="Helvetica" panose="020B0604020202020204" pitchFamily="34" charset="0"/>
                 <a:cs typeface="Helvetica" panose="020B0604020202020204" pitchFamily="34" charset="0"/>
               </a:rPr>
-              <a:t>para cada uma destas plataformas.</a:t>
+              <a:t>para cada plataforma que usam.</a:t>
+            </a:r>
+          </a:p>
+          <a:p>
+            <a:r>
+              <a:rPr lang="pt-PT" dirty="0">
+                <a:latin typeface="Helvetica" panose="020B0604020202020204" pitchFamily="34" charset="0"/>
+                <a:cs typeface="Helvetica" panose="020B0604020202020204" pitchFamily="34" charset="0"/>
+              </a:rPr>
+              <a:t>Cada aplicação desenvolvida precisa do seu próprio sistema de autenticação e autorização.</a:t>
             </a:r>
           </a:p>
         </p:txBody>
@@ -5556,7 +5556,7 @@
                 <a:latin typeface="Helvetica" panose="020B0604020202020204" pitchFamily="34" charset="0"/>
                 <a:cs typeface="Helvetica" panose="020B0604020202020204" pitchFamily="34" charset="0"/>
               </a:rPr>
-              <a:t>Utilizadores apenas precisam de decorar um par de credenciais.</a:t>
+              <a:t>Utilizadores apenas precisam de memorizar um par de credenciais.</a:t>
             </a:r>
           </a:p>
           <a:p>
@@ -6863,33 +6863,42 @@
           </a:p>
         </p:txBody>
       </p:sp>
-      <p:sp>
-        <p:nvSpPr>
-          <p:cNvPr id="18435" name="Rectangle 3"/>
-          <p:cNvSpPr>
-            <a:spLocks noGrp="1" noChangeArrowheads="1"/>
-          </p:cNvSpPr>
-          <p:nvPr>
-            <p:ph type="body" idx="1"/>
-          </p:nvPr>
-        </p:nvSpPr>
+      <p:pic>
+        <p:nvPicPr>
+          <p:cNvPr id="5" name="Picture 4">
+            <a:extLst>
+              <a:ext uri="{FF2B5EF4-FFF2-40B4-BE49-F238E27FC236}">
+                <a16:creationId xmlns:a16="http://schemas.microsoft.com/office/drawing/2014/main" id="{C15C5D22-A761-4A92-A0FF-BCE701ECB99B}"/>
+              </a:ext>
+            </a:extLst>
+          </p:cNvPr>
+          <p:cNvPicPr>
+            <a:picLocks noChangeAspect="1"/>
+          </p:cNvPicPr>
+          <p:nvPr/>
+        </p:nvPicPr>
+        <p:blipFill>
+          <a:blip r:embed="rId2">
+            <a:extLst>
+              <a:ext uri="{28A0092B-C50C-407E-A947-70E740481C1C}">
+                <a14:useLocalDpi xmlns:a14="http://schemas.microsoft.com/office/drawing/2010/main" val="0"/>
+              </a:ext>
+            </a:extLst>
+          </a:blip>
+          <a:stretch>
+            <a:fillRect/>
+          </a:stretch>
+        </p:blipFill>
         <p:spPr>
           <a:xfrm>
-            <a:off x="457200" y="2314639"/>
-            <a:ext cx="8229600" cy="4530725"/>
-          </a:xfrm>
-        </p:spPr>
-        <p:txBody>
-          <a:bodyPr/>
-          <a:lstStyle/>
-          <a:p>
-            <a:endParaRPr lang="pt-PT" dirty="0">
-              <a:latin typeface="Helvetica" panose="020B0604020202020204" pitchFamily="34" charset="0"/>
-              <a:cs typeface="Helvetica" panose="020B0604020202020204" pitchFamily="34" charset="0"/>
-            </a:endParaRPr>
-          </a:p>
-        </p:txBody>
-      </p:sp>
+            <a:off x="802092" y="1700808"/>
+            <a:ext cx="7539816" cy="4803849"/>
+          </a:xfrm>
+          <a:prstGeom prst="rect">
+            <a:avLst/>
+          </a:prstGeom>
+        </p:spPr>
+      </p:pic>
     </p:spTree>
     <p:extLst>
       <p:ext uri="{BB962C8B-B14F-4D97-AF65-F5344CB8AC3E}">
@@ -6949,7 +6958,7 @@
                 <a:latin typeface="Helvetica" panose="020B0604020202020204" pitchFamily="34" charset="0"/>
                 <a:cs typeface="Helvetica" panose="020B0604020202020204" pitchFamily="34" charset="0"/>
               </a:rPr>
-              <a:t>Conclusões</a:t>
+              <a:t>Trabalho Futuro</a:t>
             </a:r>
           </a:p>
         </p:txBody>
@@ -6966,7 +6975,7 @@
         </p:nvSpPr>
         <p:spPr>
           <a:xfrm>
-            <a:off x="457200" y="2314639"/>
+            <a:off x="457200" y="1988840"/>
             <a:ext cx="8229600" cy="4530725"/>
           </a:xfrm>
         </p:spPr>
@@ -6974,10 +6983,31 @@
           <a:bodyPr/>
           <a:lstStyle/>
           <a:p>
-            <a:endParaRPr lang="pt-PT" dirty="0">
-              <a:latin typeface="Helvetica" panose="020B0604020202020204" pitchFamily="34" charset="0"/>
-              <a:cs typeface="Helvetica" panose="020B0604020202020204" pitchFamily="34" charset="0"/>
-            </a:endParaRPr>
+            <a:r>
+              <a:rPr lang="pt-PT" dirty="0">
+                <a:latin typeface="Helvetica" panose="020B0604020202020204" pitchFamily="34" charset="0"/>
+                <a:cs typeface="Helvetica" panose="020B0604020202020204" pitchFamily="34" charset="0"/>
+              </a:rPr>
+              <a:t>Permitir registo de novas aplicações como clientes.</a:t>
+            </a:r>
+          </a:p>
+          <a:p>
+            <a:r>
+              <a:rPr lang="pt-PT" dirty="0">
+                <a:latin typeface="Helvetica" panose="020B0604020202020204" pitchFamily="34" charset="0"/>
+                <a:cs typeface="Helvetica" panose="020B0604020202020204" pitchFamily="34" charset="0"/>
+              </a:rPr>
+              <a:t>Implementar um servidor OAuth 2.0.</a:t>
+            </a:r>
+          </a:p>
+          <a:p>
+            <a:r>
+              <a:rPr lang="pt-PT" dirty="0">
+                <a:latin typeface="Helvetica" panose="020B0604020202020204" pitchFamily="34" charset="0"/>
+                <a:cs typeface="Helvetica" panose="020B0604020202020204" pitchFamily="34" charset="0"/>
+              </a:rPr>
+              <a:t>Melhorar a frontend para permitir mais funcionalidades.</a:t>
+            </a:r>
           </a:p>
         </p:txBody>
       </p:sp>

</xml_diff>